<commit_message>
Change font in L1
</commit_message>
<xml_diff>
--- a/2015/Lecture_1__19_Sep__Project_Introduction__Rus_text__No_audio.pptx
+++ b/2015/Lecture_1__19_Sep__Project_Introduction__Rus_text__No_audio.pptx
@@ -312,7 +312,7 @@
               <a:pPr>
                 <a:defRPr/>
               </a:pPr>
-              <a:t>9/18/2015</a:t>
+              <a:t>10/2/2015</a:t>
             </a:fld>
             <a:endParaRPr lang="en-US" dirty="0"/>
           </a:p>
@@ -537,7 +537,7 @@
               <a:pPr>
                 <a:defRPr/>
               </a:pPr>
-              <a:t>9/18/2015</a:t>
+              <a:t>10/2/2015</a:t>
             </a:fld>
             <a:endParaRPr lang="en-US" dirty="0"/>
           </a:p>
@@ -3267,10 +3267,9 @@
           <a:p>
             <a:pPr lvl="0"/>
             <a:r>
-              <a:rPr lang="en-US" altLang="ja-JP" smtClean="0"/>
+              <a:rPr lang="en-US" altLang="ja-JP" dirty="0" smtClean="0"/>
               <a:t>Click to edit Master title style</a:t>
             </a:r>
-            <a:endParaRPr lang="en-US" altLang="ja-JP" dirty="0" smtClean="0"/>
           </a:p>
         </p:txBody>
       </p:sp>
@@ -3377,7 +3376,7 @@
         <p:spPr>
           <a:xfrm>
             <a:off x="0" y="6596390"/>
-            <a:ext cx="360996" cy="253916"/>
+            <a:ext cx="344966" cy="253916"/>
           </a:xfrm>
           <a:prstGeom prst="rect">
             <a:avLst/>
@@ -3395,7 +3394,7 @@
                 <a:solidFill>
                   <a:schemeClr val="bg1"/>
                 </a:solidFill>
-                <a:latin typeface="Neo Sans Intel"/>
+                <a:latin typeface="+mj-lt"/>
                 <a:ea typeface="Verdana" pitchFamily="34" charset="0"/>
                 <a:cs typeface="Neo Sans Intel"/>
               </a:rPr>
@@ -3406,7 +3405,7 @@
               <a:solidFill>
                 <a:schemeClr val="bg1"/>
               </a:solidFill>
-              <a:latin typeface="Neo Sans Intel"/>
+              <a:latin typeface="+mj-lt"/>
               <a:ea typeface="Verdana" pitchFamily="34" charset="0"/>
               <a:cs typeface="Neo Sans Intel"/>
             </a:endParaRPr>
@@ -3441,7 +3440,7 @@
                 <a:solidFill>
                   <a:schemeClr val="bg1"/>
                 </a:solidFill>
-                <a:latin typeface="Neo Sans Intel" pitchFamily="34" charset="0"/>
+                <a:latin typeface="+mj-lt"/>
               </a:rPr>
               <a:t>Intel Laboratory at</a:t>
             </a:r>
@@ -3450,7 +3449,7 @@
                 <a:solidFill>
                   <a:schemeClr val="bg1"/>
                 </a:solidFill>
-                <a:latin typeface="Neo Sans Intel" pitchFamily="34" charset="0"/>
+                <a:latin typeface="+mj-lt"/>
               </a:rPr>
               <a:t> </a:t>
             </a:r>
@@ -3459,7 +3458,7 @@
                 <a:solidFill>
                   <a:schemeClr val="bg1"/>
                 </a:solidFill>
-                <a:latin typeface="Neo Sans Intel" pitchFamily="34" charset="0"/>
+                <a:latin typeface="+mj-lt"/>
               </a:rPr>
               <a:t>Moscow Institute</a:t>
             </a:r>
@@ -3468,7 +3467,7 @@
                 <a:solidFill>
                   <a:schemeClr val="bg1"/>
                 </a:solidFill>
-                <a:latin typeface="Neo Sans Intel" pitchFamily="34" charset="0"/>
+                <a:latin typeface="+mj-lt"/>
               </a:rPr>
               <a:t> of Physics and Technology </a:t>
             </a:r>
@@ -3476,7 +3475,7 @@
               <a:solidFill>
                 <a:schemeClr val="bg1"/>
               </a:solidFill>
-              <a:latin typeface="+mn-lt"/>
+              <a:latin typeface="+mj-lt"/>
             </a:endParaRPr>
           </a:p>
         </p:txBody>
@@ -3509,7 +3508,7 @@
                 <a:solidFill>
                   <a:schemeClr val="bg1"/>
                 </a:solidFill>
-                <a:latin typeface="Neo Sans Intel" pitchFamily="34" charset="0"/>
+                <a:latin typeface="+mj-lt"/>
               </a:rPr>
               <a:t>MIPT-MIPS</a:t>
             </a:r>
@@ -3518,33 +3517,15 @@
                 <a:solidFill>
                   <a:schemeClr val="bg1"/>
                 </a:solidFill>
-                <a:latin typeface="Neo Sans Intel" pitchFamily="34" charset="0"/>
+                <a:latin typeface="+mj-lt"/>
               </a:rPr>
-              <a:t> </a:t>
-            </a:r>
-            <a:r>
-              <a:rPr lang="en-US" sz="1000" b="1" kern="900" spc="120" baseline="0" dirty="0" smtClean="0">
-                <a:solidFill>
-                  <a:schemeClr val="bg1"/>
-                </a:solidFill>
-                <a:latin typeface="Neo Sans Intel" pitchFamily="34" charset="0"/>
-              </a:rPr>
-              <a:t>2015 </a:t>
-            </a:r>
-            <a:r>
-              <a:rPr lang="en-US" sz="1000" b="1" kern="900" spc="120" baseline="0" dirty="0" smtClean="0">
-                <a:solidFill>
-                  <a:schemeClr val="bg1"/>
-                </a:solidFill>
-                <a:latin typeface="Neo Sans Intel" pitchFamily="34" charset="0"/>
-              </a:rPr>
-              <a:t>Project</a:t>
+              <a:t> 2015 Project</a:t>
             </a:r>
             <a:endParaRPr lang="ru-RU" sz="1000" b="1" kern="900" spc="120" dirty="0" smtClean="0">
               <a:solidFill>
                 <a:schemeClr val="bg1"/>
               </a:solidFill>
-              <a:latin typeface="+mn-lt"/>
+              <a:latin typeface="+mj-lt"/>
             </a:endParaRPr>
           </a:p>
         </p:txBody>
@@ -3595,7 +3576,7 @@
           <a:solidFill>
             <a:schemeClr val="accent1"/>
           </a:solidFill>
-          <a:latin typeface="Neo Sans Intel"/>
+          <a:latin typeface="+mj-lt"/>
           <a:ea typeface="+mj-ea"/>
           <a:cs typeface="Neo Sans Intel"/>
         </a:defRPr>
@@ -3757,7 +3738,7 @@
           <a:solidFill>
             <a:schemeClr val="tx1"/>
           </a:solidFill>
-          <a:latin typeface="Neo Sans Intel"/>
+          <a:latin typeface="+mj-lt"/>
           <a:ea typeface="+mn-ea"/>
           <a:cs typeface="Neo Sans Intel"/>
         </a:defRPr>
@@ -3778,7 +3759,7 @@
           <a:solidFill>
             <a:schemeClr val="tx1"/>
           </a:solidFill>
-          <a:latin typeface="Neo Sans Intel"/>
+          <a:latin typeface="+mj-lt"/>
           <a:cs typeface="Neo Sans Intel"/>
         </a:defRPr>
       </a:lvl2pPr>
@@ -3798,7 +3779,7 @@
           <a:solidFill>
             <a:schemeClr val="tx1"/>
           </a:solidFill>
-          <a:latin typeface="Neo Sans Intel"/>
+          <a:latin typeface="+mj-lt"/>
           <a:cs typeface="Neo Sans Intel"/>
         </a:defRPr>
       </a:lvl3pPr>
@@ -3818,7 +3799,7 @@
           <a:solidFill>
             <a:schemeClr val="tx1"/>
           </a:solidFill>
-          <a:latin typeface="Neo Sans Intel"/>
+          <a:latin typeface="+mj-lt"/>
           <a:cs typeface="Neo Sans Intel"/>
         </a:defRPr>
       </a:lvl4pPr>
@@ -3837,7 +3818,7 @@
           <a:solidFill>
             <a:schemeClr val="tx1"/>
           </a:solidFill>
-          <a:latin typeface="Neo Sans Intel"/>
+          <a:latin typeface="+mj-lt"/>
           <a:cs typeface="Neo Sans Intel"/>
         </a:defRPr>
       </a:lvl5pPr>
@@ -4055,18 +4036,14 @@
           <a:lstStyle/>
           <a:p>
             <a:r>
-              <a:rPr lang="en-US" sz="4400" dirty="0" smtClean="0"/>
-              <a:t>MIPT-MIPS </a:t>
-            </a:r>
-            <a:r>
-              <a:rPr lang="en-US" sz="4400" dirty="0" smtClean="0"/>
-              <a:t>2015 </a:t>
-            </a:r>
-            <a:r>
-              <a:rPr lang="en-US" sz="4400" dirty="0" smtClean="0"/>
-              <a:t>Intro</a:t>
-            </a:r>
-            <a:endParaRPr lang="en-US" sz="4400" dirty="0"/>
+              <a:rPr lang="en-US" sz="4400" dirty="0" smtClean="0">
+                <a:latin typeface="+mj-lt"/>
+              </a:rPr>
+              <a:t>MIPT-MIPS 2015 Intro</a:t>
+            </a:r>
+            <a:endParaRPr lang="en-US" sz="4400" dirty="0">
+              <a:latin typeface="+mj-lt"/>
+            </a:endParaRPr>
           </a:p>
         </p:txBody>
       </p:sp>
@@ -4083,7 +4060,7 @@
         <p:spPr>
           <a:xfrm>
             <a:off x="459957" y="3750107"/>
-            <a:ext cx="4343400" cy="595035"/>
+            <a:ext cx="4343400" cy="601190"/>
           </a:xfrm>
         </p:spPr>
         <p:txBody>
@@ -4100,13 +4077,10 @@
             </a:pPr>
             <a:r>
               <a:rPr lang="en-US" dirty="0" smtClean="0">
-                <a:latin typeface="Neo Sans Intel"/>
+                <a:latin typeface="+mj-lt"/>
               </a:rPr>
               <a:t>Pavel Kryukov</a:t>
             </a:r>
-            <a:endParaRPr lang="en-US" dirty="0" smtClean="0">
-              <a:latin typeface="Neo Sans Intel"/>
-            </a:endParaRPr>
           </a:p>
           <a:p>
             <a:pPr>
@@ -4119,12 +4093,12 @@
             </a:pPr>
             <a:r>
               <a:rPr lang="en-US" dirty="0" smtClean="0">
-                <a:latin typeface="Neo Sans Intel"/>
+                <a:latin typeface="+mj-lt"/>
               </a:rPr>
               <a:t>09/19/2015</a:t>
             </a:r>
             <a:endParaRPr lang="en-US" dirty="0">
-              <a:latin typeface="Neo Sans Intel"/>
+              <a:latin typeface="+mj-lt"/>
             </a:endParaRPr>
           </a:p>
         </p:txBody>
@@ -4371,11 +4345,7 @@
             </a:pPr>
             <a:r>
               <a:rPr lang="ru-RU" sz="2200" dirty="0" smtClean="0"/>
-              <a:t>Системы контроля версий </a:t>
-            </a:r>
-            <a:r>
-              <a:rPr lang="ru-RU" sz="2200" dirty="0" smtClean="0"/>
-              <a:t>(</a:t>
+              <a:t>Системы контроля версий (</a:t>
             </a:r>
             <a:r>
               <a:rPr lang="en-US" sz="2200" dirty="0" err="1" smtClean="0"/>
@@ -6653,15 +6623,7 @@
             </a:r>
             <a:r>
               <a:rPr lang="ru-RU" dirty="0" smtClean="0"/>
-              <a:t>включает </a:t>
-            </a:r>
-            <a:r>
-              <a:rPr lang="ru-RU" dirty="0" smtClean="0"/>
-              <a:t>в </a:t>
-            </a:r>
-            <a:r>
-              <a:rPr lang="ru-RU" dirty="0" smtClean="0"/>
-              <a:t>себя полный спектр необходимых инструментов: </a:t>
+              <a:t>включает в себя полный спектр необходимых инструментов: </a:t>
             </a:r>
             <a:r>
               <a:rPr lang="ru-RU" sz="2000" dirty="0" smtClean="0"/>
@@ -7335,15 +7297,7 @@
             </a:pPr>
             <a:r>
               <a:rPr lang="ru-RU" sz="2000" dirty="0" smtClean="0"/>
-              <a:t>Место: </a:t>
-            </a:r>
-            <a:r>
-              <a:rPr lang="ru-RU" sz="2000" dirty="0" smtClean="0"/>
-              <a:t>123 </a:t>
-            </a:r>
-            <a:r>
-              <a:rPr lang="ru-RU" sz="2000" dirty="0" smtClean="0"/>
-              <a:t>ГК</a:t>
+              <a:t>Место: 123 ГК</a:t>
             </a:r>
           </a:p>
           <a:p>
@@ -9607,10 +9561,14 @@
           <a:lstStyle/>
           <a:p>
             <a:r>
-              <a:rPr lang="en-US" dirty="0" smtClean="0"/>
+              <a:rPr lang="en-US" dirty="0" smtClean="0">
+                <a:latin typeface="+mj-lt"/>
+              </a:rPr>
               <a:t>Thank You</a:t>
             </a:r>
-            <a:endParaRPr lang="en-US" dirty="0"/>
+            <a:endParaRPr lang="en-US" dirty="0">
+              <a:latin typeface="+mj-lt"/>
+            </a:endParaRPr>
           </a:p>
         </p:txBody>
       </p:sp>
@@ -10802,21 +10760,21 @@
 </file>
 
 <file path=customXml/item1.xml><?xml version="1.0" encoding="utf-8"?>
+<?mso-contentType ?>
+<FormTemplates xmlns="http://schemas.microsoft.com/sharepoint/v3/contenttype/forms">
+  <Display>DocumentLibraryForm</Display>
+  <Edit>DocumentLibraryForm</Edit>
+  <New>DocumentLibraryForm</New>
+</FormTemplates>
+</file>
+
+<file path=customXml/item2.xml><?xml version="1.0" encoding="utf-8"?>
 <p:properties xmlns:p="http://schemas.microsoft.com/office/2006/metadata/properties" xmlns:xsi="http://www.w3.org/2001/XMLSchema-instance">
   <documentManagement>
     <PublishingExpirationDate xmlns="http://schemas.microsoft.com/sharepoint/v3" xsi:nil="true"/>
     <PublishingStartDate xmlns="http://schemas.microsoft.com/sharepoint/v3" xsi:nil="true"/>
   </documentManagement>
 </p:properties>
-</file>
-
-<file path=customXml/item2.xml><?xml version="1.0" encoding="utf-8"?>
-<?mso-contentType ?>
-<FormTemplates xmlns="http://schemas.microsoft.com/sharepoint/v3/contenttype/forms">
-  <Display>DocumentLibraryForm</Display>
-  <Edit>DocumentLibraryForm</Edit>
-  <New>DocumentLibraryForm</New>
-</FormTemplates>
 </file>
 
 <file path=customXml/item3.xml><?xml version="1.0" encoding="utf-8"?>
@@ -10886,6 +10844,14 @@
 </file>
 
 <file path=customXml/itemProps1.xml><?xml version="1.0" encoding="utf-8"?>
+<ds:datastoreItem xmlns:ds="http://schemas.openxmlformats.org/officeDocument/2006/customXml" ds:itemID="{C5CC5FB6-44E0-47C0-972B-EBB94824D4B0}">
+  <ds:schemaRefs>
+    <ds:schemaRef ds:uri="http://schemas.microsoft.com/sharepoint/v3/contenttype/forms"/>
+  </ds:schemaRefs>
+</ds:datastoreItem>
+</file>
+
+<file path=customXml/itemProps2.xml><?xml version="1.0" encoding="utf-8"?>
 <ds:datastoreItem xmlns:ds="http://schemas.openxmlformats.org/officeDocument/2006/customXml" ds:itemID="{14A94C8E-3E2B-4AD9-8D67-7815198BE085}">
   <ds:schemaRefs>
     <ds:schemaRef ds:uri="http://schemas.microsoft.com/sharepoint/v3"/>
@@ -10896,14 +10862,6 @@
     <ds:schemaRef ds:uri="http://schemas.microsoft.com/office/2006/metadata/properties"/>
     <ds:schemaRef ds:uri="http://www.w3.org/XML/1998/namespace"/>
     <ds:schemaRef ds:uri="http://purl.org/dc/dcmitype/"/>
-  </ds:schemaRefs>
-</ds:datastoreItem>
-</file>
-
-<file path=customXml/itemProps2.xml><?xml version="1.0" encoding="utf-8"?>
-<ds:datastoreItem xmlns:ds="http://schemas.openxmlformats.org/officeDocument/2006/customXml" ds:itemID="{C5CC5FB6-44E0-47C0-972B-EBB94824D4B0}">
-  <ds:schemaRefs>
-    <ds:schemaRef ds:uri="http://schemas.microsoft.com/sharepoint/v3/contenttype/forms"/>
   </ds:schemaRefs>
 </ds:datastoreItem>
 </file>

</xml_diff>